<commit_message>
Fix text wrapping issues in presentations
- Split Composition slide 1: Widen orange block for 'SOFTWARE' text
- Executive Black slide 5: Change 'Planungsalgorithmus' to 'Touren-Planung' to fit card width
- Data Forward slide 1: Increase hero text container width
- Update description text for Web-Backoffice feature
</commit_message>
<xml_diff>
--- a/output/01-executive-black.pptx
+++ b/output/01-executive-black.pptx
@@ -3312,7 +3312,7 @@
         </p:nvSpPr>
         <p:spPr>
           <a:xfrm>
-            <a:off x="640080" y="2103120"/>
+            <a:off x="640080" y="2057400"/>
             <a:ext cx="2194560" cy="365760"/>
           </a:xfrm>
           <a:prstGeom prst="rect">
@@ -3329,7 +3329,7 @@
               <a:buNone/>
             </a:pPr>
             <a:r>
-              <a:rPr lang="en-US" sz="1800" b="1" dirty="0">
+              <a:rPr lang="en-US" sz="1400" b="1" dirty="0">
                 <a:solidFill>
                   <a:srgbClr val="FFFFFF"/>
                 </a:solidFill>
@@ -3337,9 +3337,9 @@
                 <a:ea typeface="Segoe UI" pitchFamily="34" charset="-122"/>
                 <a:cs typeface="Segoe UI" pitchFamily="34" charset="-120"/>
               </a:rPr>
-              <a:t>Planungsalgorithmus</a:t>
-            </a:r>
-            <a:endParaRPr lang="en-US" sz="1800" dirty="0"/>
+              <a:t>Touren-Planung</a:t>
+            </a:r>
+            <a:endParaRPr lang="en-US" sz="1400" dirty="0"/>
           </a:p>
         </p:txBody>
       </p:sp>
@@ -3351,7 +3351,7 @@
         </p:nvSpPr>
         <p:spPr>
           <a:xfrm>
-            <a:off x="640080" y="2468880"/>
+            <a:off x="640080" y="2423160"/>
             <a:ext cx="2194560" cy="320040"/>
           </a:xfrm>
           <a:prstGeom prst="rect">
@@ -3379,7 +3379,7 @@
                 <a:ea typeface="Segoe UI" pitchFamily="34" charset="-122"/>
                 <a:cs typeface="Segoe UI" pitchFamily="34" charset="-120"/>
               </a:rPr>
-              <a:t>Intelligente Tourenoptimierung</a:t>
+              <a:t>Intelligente Routenoptimierung</a:t>
             </a:r>
             <a:endParaRPr lang="en-US" sz="1200" dirty="0"/>
           </a:p>
@@ -3459,7 +3459,7 @@
         </p:nvSpPr>
         <p:spPr>
           <a:xfrm>
-            <a:off x="3474720" y="2103120"/>
+            <a:off x="3474720" y="2057400"/>
             <a:ext cx="2194560" cy="365760"/>
           </a:xfrm>
           <a:prstGeom prst="rect">
@@ -3476,7 +3476,7 @@
               <a:buNone/>
             </a:pPr>
             <a:r>
-              <a:rPr lang="en-US" sz="1800" b="1" dirty="0">
+              <a:rPr lang="en-US" sz="1400" b="1" dirty="0">
                 <a:solidFill>
                   <a:srgbClr val="FFFFFF"/>
                 </a:solidFill>
@@ -3486,7 +3486,7 @@
               </a:rPr>
               <a:t>Driver App</a:t>
             </a:r>
-            <a:endParaRPr lang="en-US" sz="1800" dirty="0"/>
+            <a:endParaRPr lang="en-US" sz="1400" dirty="0"/>
           </a:p>
         </p:txBody>
       </p:sp>
@@ -3498,7 +3498,7 @@
         </p:nvSpPr>
         <p:spPr>
           <a:xfrm>
-            <a:off x="3474720" y="2468880"/>
+            <a:off x="3474720" y="2423160"/>
             <a:ext cx="2194560" cy="320040"/>
           </a:xfrm>
           <a:prstGeom prst="rect">
@@ -3606,7 +3606,7 @@
         </p:nvSpPr>
         <p:spPr>
           <a:xfrm>
-            <a:off x="6309360" y="2103120"/>
+            <a:off x="6309360" y="2057400"/>
             <a:ext cx="2194560" cy="365760"/>
           </a:xfrm>
           <a:prstGeom prst="rect">
@@ -3623,7 +3623,7 @@
               <a:buNone/>
             </a:pPr>
             <a:r>
-              <a:rPr lang="en-US" sz="1800" b="1" dirty="0">
+              <a:rPr lang="en-US" sz="1400" b="1" dirty="0">
                 <a:solidFill>
                   <a:srgbClr val="FFFFFF"/>
                 </a:solidFill>
@@ -3633,7 +3633,7 @@
               </a:rPr>
               <a:t>Web-Backoffice</a:t>
             </a:r>
-            <a:endParaRPr lang="en-US" sz="1800" dirty="0"/>
+            <a:endParaRPr lang="en-US" sz="1400" dirty="0"/>
           </a:p>
         </p:txBody>
       </p:sp>
@@ -3645,7 +3645,7 @@
         </p:nvSpPr>
         <p:spPr>
           <a:xfrm>
-            <a:off x="6309360" y="2468880"/>
+            <a:off x="6309360" y="2423160"/>
             <a:ext cx="2194560" cy="320040"/>
           </a:xfrm>
           <a:prstGeom prst="rect">
@@ -3673,7 +3673,7 @@
                 <a:ea typeface="Segoe UI" pitchFamily="34" charset="-122"/>
                 <a:cs typeface="Segoe UI" pitchFamily="34" charset="-120"/>
               </a:rPr>
-              <a:t>Zentrale Verwaltungsoberfläche</a:t>
+              <a:t>Zentrale Verwaltung</a:t>
             </a:r>
             <a:endParaRPr lang="en-US" sz="1200" dirty="0"/>
           </a:p>
@@ -3753,7 +3753,7 @@
         </p:nvSpPr>
         <p:spPr>
           <a:xfrm>
-            <a:off x="640080" y="3657600"/>
+            <a:off x="640080" y="3611880"/>
             <a:ext cx="2194560" cy="365760"/>
           </a:xfrm>
           <a:prstGeom prst="rect">
@@ -3770,7 +3770,7 @@
               <a:buNone/>
             </a:pPr>
             <a:r>
-              <a:rPr lang="en-US" sz="1800" b="1" dirty="0">
+              <a:rPr lang="en-US" sz="1400" b="1" dirty="0">
                 <a:solidFill>
                   <a:srgbClr val="FFFFFF"/>
                 </a:solidFill>
@@ -3780,7 +3780,7 @@
               </a:rPr>
               <a:t>API-Integration</a:t>
             </a:r>
-            <a:endParaRPr lang="en-US" sz="1800" dirty="0"/>
+            <a:endParaRPr lang="en-US" sz="1400" dirty="0"/>
           </a:p>
         </p:txBody>
       </p:sp>
@@ -3792,7 +3792,7 @@
         </p:nvSpPr>
         <p:spPr>
           <a:xfrm>
-            <a:off x="640080" y="4023360"/>
+            <a:off x="640080" y="3977640"/>
             <a:ext cx="2194560" cy="320040"/>
           </a:xfrm>
           <a:prstGeom prst="rect">
@@ -3900,7 +3900,7 @@
         </p:nvSpPr>
         <p:spPr>
           <a:xfrm>
-            <a:off x="3474720" y="3657600"/>
+            <a:off x="3474720" y="3611880"/>
             <a:ext cx="2194560" cy="365760"/>
           </a:xfrm>
           <a:prstGeom prst="rect">
@@ -3917,7 +3917,7 @@
               <a:buNone/>
             </a:pPr>
             <a:r>
-              <a:rPr lang="en-US" sz="1800" b="1" dirty="0">
+              <a:rPr lang="en-US" sz="1400" b="1" dirty="0">
                 <a:solidFill>
                   <a:srgbClr val="FFFFFF"/>
                 </a:solidFill>
@@ -3927,7 +3927,7 @@
               </a:rPr>
               <a:t>Live-Monitoring</a:t>
             </a:r>
-            <a:endParaRPr lang="en-US" sz="1800" dirty="0"/>
+            <a:endParaRPr lang="en-US" sz="1400" dirty="0"/>
           </a:p>
         </p:txBody>
       </p:sp>
@@ -3939,7 +3939,7 @@
         </p:nvSpPr>
         <p:spPr>
           <a:xfrm>
-            <a:off x="3474720" y="4023360"/>
+            <a:off x="3474720" y="3977640"/>
             <a:ext cx="2194560" cy="320040"/>
           </a:xfrm>
           <a:prstGeom prst="rect">
@@ -4047,7 +4047,7 @@
         </p:nvSpPr>
         <p:spPr>
           <a:xfrm>
-            <a:off x="6309360" y="3657600"/>
+            <a:off x="6309360" y="3611880"/>
             <a:ext cx="2194560" cy="365760"/>
           </a:xfrm>
           <a:prstGeom prst="rect">
@@ -4064,7 +4064,7 @@
               <a:buNone/>
             </a:pPr>
             <a:r>
-              <a:rPr lang="en-US" sz="1800" b="1" dirty="0">
+              <a:rPr lang="en-US" sz="1400" b="1" dirty="0">
                 <a:solidFill>
                   <a:srgbClr val="FFFFFF"/>
                 </a:solidFill>
@@ -4074,7 +4074,7 @@
               </a:rPr>
               <a:t>Analytics</a:t>
             </a:r>
-            <a:endParaRPr lang="en-US" sz="1800" dirty="0"/>
+            <a:endParaRPr lang="en-US" sz="1400" dirty="0"/>
           </a:p>
         </p:txBody>
       </p:sp>
@@ -4086,7 +4086,7 @@
         </p:nvSpPr>
         <p:spPr>
           <a:xfrm>
-            <a:off x="6309360" y="4023360"/>
+            <a:off x="6309360" y="3977640"/>
             <a:ext cx="2194560" cy="320040"/>
           </a:xfrm>
           <a:prstGeom prst="rect">

</xml_diff>